<commit_message>
fixed documentation for coordinate system for motion vectors (and minor other changes)
</commit_message>
<xml_diff>
--- a/documentation/contrib/Motion_files_KCL/Documentation/MotionCoordinates.pptx
+++ b/documentation/contrib/Motion_files_KCL/Documentation/MotionCoordinates.pptx
@@ -288,7 +288,7 @@
           <a:p>
             <a:fld id="{B1D08DFA-7EBD-0E41-A0EE-3FF005398999}" type="datetimeFigureOut">
               <a:rPr lang="en-US" smtClean="0"/>
-              <a:t>13/02/2013</a:t>
+              <a:t>01/07/2013</a:t>
             </a:fld>
             <a:endParaRPr lang="en-US"/>
           </a:p>
@@ -458,7 +458,7 @@
           <a:p>
             <a:fld id="{B1D08DFA-7EBD-0E41-A0EE-3FF005398999}" type="datetimeFigureOut">
               <a:rPr lang="en-US" smtClean="0"/>
-              <a:t>13/02/2013</a:t>
+              <a:t>01/07/2013</a:t>
             </a:fld>
             <a:endParaRPr lang="en-US"/>
           </a:p>
@@ -638,7 +638,7 @@
           <a:p>
             <a:fld id="{B1D08DFA-7EBD-0E41-A0EE-3FF005398999}" type="datetimeFigureOut">
               <a:rPr lang="en-US" smtClean="0"/>
-              <a:t>13/02/2013</a:t>
+              <a:t>01/07/2013</a:t>
             </a:fld>
             <a:endParaRPr lang="en-US"/>
           </a:p>
@@ -808,7 +808,7 @@
           <a:p>
             <a:fld id="{B1D08DFA-7EBD-0E41-A0EE-3FF005398999}" type="datetimeFigureOut">
               <a:rPr lang="en-US" smtClean="0"/>
-              <a:t>13/02/2013</a:t>
+              <a:t>01/07/2013</a:t>
             </a:fld>
             <a:endParaRPr lang="en-US"/>
           </a:p>
@@ -1054,7 +1054,7 @@
           <a:p>
             <a:fld id="{B1D08DFA-7EBD-0E41-A0EE-3FF005398999}" type="datetimeFigureOut">
               <a:rPr lang="en-US" smtClean="0"/>
-              <a:t>13/02/2013</a:t>
+              <a:t>01/07/2013</a:t>
             </a:fld>
             <a:endParaRPr lang="en-US"/>
           </a:p>
@@ -1342,7 +1342,7 @@
           <a:p>
             <a:fld id="{B1D08DFA-7EBD-0E41-A0EE-3FF005398999}" type="datetimeFigureOut">
               <a:rPr lang="en-US" smtClean="0"/>
-              <a:t>13/02/2013</a:t>
+              <a:t>01/07/2013</a:t>
             </a:fld>
             <a:endParaRPr lang="en-US"/>
           </a:p>
@@ -1764,7 +1764,7 @@
           <a:p>
             <a:fld id="{B1D08DFA-7EBD-0E41-A0EE-3FF005398999}" type="datetimeFigureOut">
               <a:rPr lang="en-US" smtClean="0"/>
-              <a:t>13/02/2013</a:t>
+              <a:t>01/07/2013</a:t>
             </a:fld>
             <a:endParaRPr lang="en-US"/>
           </a:p>
@@ -1882,7 +1882,7 @@
           <a:p>
             <a:fld id="{B1D08DFA-7EBD-0E41-A0EE-3FF005398999}" type="datetimeFigureOut">
               <a:rPr lang="en-US" smtClean="0"/>
-              <a:t>13/02/2013</a:t>
+              <a:t>01/07/2013</a:t>
             </a:fld>
             <a:endParaRPr lang="en-US"/>
           </a:p>
@@ -1977,7 +1977,7 @@
           <a:p>
             <a:fld id="{B1D08DFA-7EBD-0E41-A0EE-3FF005398999}" type="datetimeFigureOut">
               <a:rPr lang="en-US" smtClean="0"/>
-              <a:t>13/02/2013</a:t>
+              <a:t>01/07/2013</a:t>
             </a:fld>
             <a:endParaRPr lang="en-US"/>
           </a:p>
@@ -2254,7 +2254,7 @@
           <a:p>
             <a:fld id="{B1D08DFA-7EBD-0E41-A0EE-3FF005398999}" type="datetimeFigureOut">
               <a:rPr lang="en-US" smtClean="0"/>
-              <a:t>13/02/2013</a:t>
+              <a:t>01/07/2013</a:t>
             </a:fld>
             <a:endParaRPr lang="en-US"/>
           </a:p>
@@ -2507,7 +2507,7 @@
           <a:p>
             <a:fld id="{B1D08DFA-7EBD-0E41-A0EE-3FF005398999}" type="datetimeFigureOut">
               <a:rPr lang="en-US" smtClean="0"/>
-              <a:t>13/02/2013</a:t>
+              <a:t>01/07/2013</a:t>
             </a:fld>
             <a:endParaRPr lang="en-US"/>
           </a:p>
@@ -2720,7 +2720,7 @@
           <a:p>
             <a:fld id="{B1D08DFA-7EBD-0E41-A0EE-3FF005398999}" type="datetimeFigureOut">
               <a:rPr lang="en-US" smtClean="0"/>
-              <a:t>13/02/2013</a:t>
+              <a:t>01/07/2013</a:t>
             </a:fld>
             <a:endParaRPr lang="en-US"/>
           </a:p>
@@ -5501,8 +5501,8 @@
           <p:nvPr/>
         </p:nvCxnSpPr>
         <p:spPr>
-          <a:xfrm flipH="1" flipV="1">
-            <a:off x="5464783" y="2692603"/>
+          <a:xfrm rot="10800000" flipH="1" flipV="1">
+            <a:off x="5476878" y="2704698"/>
             <a:ext cx="315168" cy="567184"/>
           </a:xfrm>
           <a:prstGeom prst="straightConnector1">
@@ -5513,82 +5513,6 @@
               <a:srgbClr val="660066"/>
             </a:solidFill>
             <a:headEnd type="diamond"/>
-            <a:tailEnd type="triangle"/>
-          </a:ln>
-          <a:effectLst/>
-        </p:spPr>
-        <p:style>
-          <a:lnRef idx="2">
-            <a:schemeClr val="accent1"/>
-          </a:lnRef>
-          <a:fillRef idx="0">
-            <a:schemeClr val="accent1"/>
-          </a:fillRef>
-          <a:effectRef idx="1">
-            <a:schemeClr val="accent1"/>
-          </a:effectRef>
-          <a:fontRef idx="minor">
-            <a:schemeClr val="tx1"/>
-          </a:fontRef>
-        </p:style>
-      </p:cxnSp>
-      <p:cxnSp>
-        <p:nvCxnSpPr>
-          <p:cNvPr id="47" name="Straight Arrow Connector 46"/>
-          <p:cNvCxnSpPr/>
-          <p:nvPr/>
-        </p:nvCxnSpPr>
-        <p:spPr>
-          <a:xfrm flipH="1" flipV="1">
-            <a:off x="7654230" y="4999582"/>
-            <a:ext cx="1" cy="751110"/>
-          </a:xfrm>
-          <a:prstGeom prst="straightConnector1">
-            <a:avLst/>
-          </a:prstGeom>
-          <a:ln w="76200" cmpd="sng">
-            <a:solidFill>
-              <a:srgbClr val="660066"/>
-            </a:solidFill>
-            <a:headEnd type="none"/>
-            <a:tailEnd type="triangle"/>
-          </a:ln>
-          <a:effectLst/>
-        </p:spPr>
-        <p:style>
-          <a:lnRef idx="2">
-            <a:schemeClr val="accent1"/>
-          </a:lnRef>
-          <a:fillRef idx="0">
-            <a:schemeClr val="accent1"/>
-          </a:fillRef>
-          <a:effectRef idx="1">
-            <a:schemeClr val="accent1"/>
-          </a:effectRef>
-          <a:fontRef idx="minor">
-            <a:schemeClr val="tx1"/>
-          </a:fontRef>
-        </p:style>
-      </p:cxnSp>
-      <p:cxnSp>
-        <p:nvCxnSpPr>
-          <p:cNvPr id="49" name="Straight Arrow Connector 48"/>
-          <p:cNvCxnSpPr/>
-          <p:nvPr/>
-        </p:nvCxnSpPr>
-        <p:spPr>
-          <a:xfrm flipH="1">
-            <a:off x="6742507" y="5731100"/>
-            <a:ext cx="932987" cy="0"/>
-          </a:xfrm>
-          <a:prstGeom prst="straightConnector1">
-            <a:avLst/>
-          </a:prstGeom>
-          <a:ln w="76200" cmpd="sng">
-            <a:solidFill>
-              <a:srgbClr val="660066"/>
-            </a:solidFill>
-            <a:headEnd type="none"/>
             <a:tailEnd type="triangle"/>
           </a:ln>
           <a:effectLst/>
@@ -5726,92 +5650,6 @@
               </a:rPr>
               <a:t>y</a:t>
             </a:r>
-          </a:p>
-        </p:txBody>
-      </p:sp>
-      <p:sp>
-        <p:nvSpPr>
-          <p:cNvPr id="53" name="TextBox 52"/>
-          <p:cNvSpPr txBox="1"/>
-          <p:nvPr/>
-        </p:nvSpPr>
-        <p:spPr>
-          <a:xfrm>
-            <a:off x="6512452" y="5622366"/>
-            <a:ext cx="655125" cy="553998"/>
-          </a:xfrm>
-          <a:prstGeom prst="rect">
-            <a:avLst/>
-          </a:prstGeom>
-          <a:noFill/>
-        </p:spPr>
-        <p:txBody>
-          <a:bodyPr wrap="none" rtlCol="0">
-            <a:spAutoFit/>
-          </a:bodyPr>
-          <a:lstStyle/>
-          <a:p>
-            <a:r>
-              <a:rPr lang="en-US" sz="3000" b="1" i="1" dirty="0" smtClean="0">
-                <a:latin typeface="Times"/>
-                <a:cs typeface="Times"/>
-              </a:rPr>
-              <a:t>m</a:t>
-            </a:r>
-            <a:r>
-              <a:rPr lang="en-US" sz="3000" b="1" i="1" baseline="-25000" dirty="0" smtClean="0">
-                <a:latin typeface="Times"/>
-                <a:cs typeface="Times"/>
-              </a:rPr>
-              <a:t>x</a:t>
-            </a:r>
-            <a:endParaRPr lang="en-US" sz="3000" dirty="0">
-              <a:latin typeface="Times"/>
-              <a:cs typeface="Times"/>
-            </a:endParaRPr>
-          </a:p>
-        </p:txBody>
-      </p:sp>
-      <p:sp>
-        <p:nvSpPr>
-          <p:cNvPr id="54" name="TextBox 53"/>
-          <p:cNvSpPr txBox="1"/>
-          <p:nvPr/>
-        </p:nvSpPr>
-        <p:spPr>
-          <a:xfrm>
-            <a:off x="7071113" y="4894904"/>
-            <a:ext cx="640723" cy="553998"/>
-          </a:xfrm>
-          <a:prstGeom prst="rect">
-            <a:avLst/>
-          </a:prstGeom>
-          <a:noFill/>
-        </p:spPr>
-        <p:txBody>
-          <a:bodyPr wrap="none" rtlCol="0">
-            <a:spAutoFit/>
-          </a:bodyPr>
-          <a:lstStyle/>
-          <a:p>
-            <a:r>
-              <a:rPr lang="en-US" sz="3000" b="1" i="1" dirty="0" smtClean="0">
-                <a:latin typeface="Times"/>
-                <a:cs typeface="Times"/>
-              </a:rPr>
-              <a:t>m</a:t>
-            </a:r>
-            <a:r>
-              <a:rPr lang="en-US" sz="3000" b="1" i="1" baseline="-25000" dirty="0" smtClean="0">
-                <a:latin typeface="Times"/>
-                <a:cs typeface="Times"/>
-              </a:rPr>
-              <a:t>y</a:t>
-            </a:r>
-            <a:endParaRPr lang="en-US" sz="3000" dirty="0">
-              <a:latin typeface="Times"/>
-              <a:cs typeface="Times"/>
-            </a:endParaRPr>
           </a:p>
         </p:txBody>
       </p:sp>
@@ -8237,87 +8075,6 @@
           </a:p>
         </p:txBody>
       </p:sp>
-      <p:cxnSp>
-        <p:nvCxnSpPr>
-          <p:cNvPr id="100" name="Straight Arrow Connector 99"/>
-          <p:cNvCxnSpPr/>
-          <p:nvPr/>
-        </p:nvCxnSpPr>
-        <p:spPr>
-          <a:xfrm>
-            <a:off x="7654232" y="5727802"/>
-            <a:ext cx="513068" cy="301652"/>
-          </a:xfrm>
-          <a:prstGeom prst="straightConnector1">
-            <a:avLst/>
-          </a:prstGeom>
-          <a:ln w="76200" cmpd="sng">
-            <a:solidFill>
-              <a:srgbClr val="660066"/>
-            </a:solidFill>
-            <a:headEnd type="none"/>
-            <a:tailEnd type="triangle"/>
-          </a:ln>
-          <a:effectLst/>
-        </p:spPr>
-        <p:style>
-          <a:lnRef idx="2">
-            <a:schemeClr val="accent1"/>
-          </a:lnRef>
-          <a:fillRef idx="0">
-            <a:schemeClr val="accent1"/>
-          </a:fillRef>
-          <a:effectRef idx="1">
-            <a:schemeClr val="accent1"/>
-          </a:effectRef>
-          <a:fontRef idx="minor">
-            <a:schemeClr val="tx1"/>
-          </a:fontRef>
-        </p:style>
-      </p:cxnSp>
-      <p:sp>
-        <p:nvSpPr>
-          <p:cNvPr id="101" name="TextBox 100"/>
-          <p:cNvSpPr txBox="1"/>
-          <p:nvPr/>
-        </p:nvSpPr>
-        <p:spPr>
-          <a:xfrm>
-            <a:off x="7390614" y="5715118"/>
-            <a:ext cx="626697" cy="553998"/>
-          </a:xfrm>
-          <a:prstGeom prst="rect">
-            <a:avLst/>
-          </a:prstGeom>
-          <a:noFill/>
-        </p:spPr>
-        <p:txBody>
-          <a:bodyPr wrap="none" rtlCol="0">
-            <a:spAutoFit/>
-          </a:bodyPr>
-          <a:lstStyle/>
-          <a:p>
-            <a:r>
-              <a:rPr lang="en-US" sz="3000" b="1" i="1" dirty="0" err="1" smtClean="0">
-                <a:latin typeface="Times"/>
-                <a:cs typeface="Times"/>
-              </a:rPr>
-              <a:t>m</a:t>
-            </a:r>
-            <a:r>
-              <a:rPr lang="en-US" sz="3000" b="1" i="1" baseline="-25000" dirty="0" err="1" smtClean="0">
-                <a:latin typeface="Times"/>
-                <a:cs typeface="Times"/>
-              </a:rPr>
-              <a:t>z</a:t>
-            </a:r>
-            <a:endParaRPr lang="en-US" sz="3000" dirty="0">
-              <a:latin typeface="Times"/>
-              <a:cs typeface="Times"/>
-            </a:endParaRPr>
-          </a:p>
-        </p:txBody>
-      </p:sp>
       <p:sp>
         <p:nvSpPr>
           <p:cNvPr id="107" name="Rectangle 106"/>
@@ -8326,7 +8083,7 @@
         </p:nvSpPr>
         <p:spPr>
           <a:xfrm>
-            <a:off x="5331002" y="2263433"/>
+            <a:off x="5529413" y="2521364"/>
             <a:ext cx="448949" cy="461665"/>
           </a:xfrm>
           <a:prstGeom prst="rect">
@@ -8509,10 +8266,6 @@
               </a:rPr>
               <a:t>) directions with respect to the coordinate system </a:t>
             </a:r>
-            <a:endParaRPr lang="en-US" sz="2400" dirty="0" smtClean="0">
-              <a:latin typeface="Times New Roman"/>
-              <a:cs typeface="Times New Roman"/>
-            </a:endParaRPr>
           </a:p>
           <a:p>
             <a:pPr algn="ctr"/>
@@ -8577,14 +8330,7 @@
                 <a:latin typeface="Times New Roman"/>
                 <a:cs typeface="Times New Roman"/>
               </a:rPr>
-              <a:t>inferior, </a:t>
-            </a:r>
-            <a:r>
-              <a:rPr lang="en-US" sz="2400" dirty="0" smtClean="0">
-                <a:latin typeface="Times New Roman"/>
-                <a:cs typeface="Times New Roman"/>
-              </a:rPr>
-              <a:t>posterior to anterior, left to right)   </a:t>
+              <a:t>inferior, posterior to anterior, left to right)   </a:t>
             </a:r>
             <a:endParaRPr lang="en-US" sz="2400" dirty="0">
               <a:latin typeface="Times New Roman"/>

</xml_diff>